<commit_message>
battle system fix + Adv view update
</commit_message>
<xml_diff>
--- a/Guild Master(promo).pptx
+++ b/Guild Master(promo).pptx
@@ -11,13 +11,14 @@
     <p:sldId id="259" r:id="rId5"/>
     <p:sldId id="260" r:id="rId6"/>
     <p:sldId id="261" r:id="rId7"/>
-    <p:sldId id="262" r:id="rId8"/>
-    <p:sldId id="263" r:id="rId9"/>
-    <p:sldId id="264" r:id="rId10"/>
-    <p:sldId id="265" r:id="rId11"/>
-    <p:sldId id="266" r:id="rId12"/>
-    <p:sldId id="267" r:id="rId13"/>
-    <p:sldId id="268" r:id="rId14"/>
+    <p:sldId id="269" r:id="rId8"/>
+    <p:sldId id="262" r:id="rId9"/>
+    <p:sldId id="263" r:id="rId10"/>
+    <p:sldId id="264" r:id="rId11"/>
+    <p:sldId id="265" r:id="rId12"/>
+    <p:sldId id="266" r:id="rId13"/>
+    <p:sldId id="267" r:id="rId14"/>
+    <p:sldId id="268" r:id="rId15"/>
   </p:sldIdLst>
   <p:sldSz cx="12192000" cy="6858000"/>
   <p:notesSz cx="6858000" cy="9144000"/>
@@ -116,6 +117,11 @@
       </a:defRPr>
     </a:lvl9pPr>
   </p:defaultTextStyle>
+  <p:extLst>
+    <p:ext uri="{EFAFB233-063F-42B5-8137-9DF3F51BA10A}">
+      <p15:sldGuideLst xmlns:p15="http://schemas.microsoft.com/office/powerpoint/2012/main"/>
+    </p:ext>
+  </p:extLst>
 </p:presentation>
 </file>
 
@@ -3533,6 +3539,105 @@
           <p:cNvPr id="2" name="Title 1">
             <a:extLst>
               <a:ext uri="{FF2B5EF4-FFF2-40B4-BE49-F238E27FC236}">
+                <a16:creationId xmlns:a16="http://schemas.microsoft.com/office/drawing/2014/main" id="{C3E15874-AE93-4FD0-84A8-A409885B3D9D}"/>
+              </a:ext>
+            </a:extLst>
+          </p:cNvPr>
+          <p:cNvSpPr>
+            <a:spLocks noGrp="1"/>
+          </p:cNvSpPr>
+          <p:nvPr>
+            <p:ph type="title"/>
+          </p:nvPr>
+        </p:nvSpPr>
+        <p:spPr/>
+        <p:txBody>
+          <a:bodyPr/>
+          <a:lstStyle/>
+          <a:p>
+            <a:r>
+              <a:rPr lang="ru-RU" dirty="0">
+                <a:solidFill>
+                  <a:schemeClr val="bg1"/>
+                </a:solidFill>
+              </a:rPr>
+              <a:t>Отчет после боя</a:t>
+            </a:r>
+            <a:endParaRPr lang="en-US" dirty="0">
+              <a:solidFill>
+                <a:schemeClr val="bg1"/>
+              </a:solidFill>
+            </a:endParaRPr>
+          </a:p>
+        </p:txBody>
+      </p:sp>
+      <p:pic>
+        <p:nvPicPr>
+          <p:cNvPr id="4" name="Content Placeholder 3">
+            <a:extLst>
+              <a:ext uri="{FF2B5EF4-FFF2-40B4-BE49-F238E27FC236}">
+                <a16:creationId xmlns:a16="http://schemas.microsoft.com/office/drawing/2014/main" id="{0193E776-2E0C-4FC7-AE0F-AF6C4A760EAB}"/>
+              </a:ext>
+            </a:extLst>
+          </p:cNvPr>
+          <p:cNvPicPr>
+            <a:picLocks noGrp="1" noChangeAspect="1"/>
+          </p:cNvPicPr>
+          <p:nvPr>
+            <p:ph idx="1"/>
+          </p:nvPr>
+        </p:nvPicPr>
+        <p:blipFill>
+          <a:blip r:embed="rId2"/>
+          <a:stretch>
+            <a:fillRect/>
+          </a:stretch>
+        </p:blipFill>
+        <p:spPr>
+          <a:xfrm>
+            <a:off x="2932546" y="1825625"/>
+            <a:ext cx="6326908" cy="4351338"/>
+          </a:xfrm>
+          <a:prstGeom prst="rect">
+            <a:avLst/>
+          </a:prstGeom>
+        </p:spPr>
+      </p:pic>
+    </p:spTree>
+    <p:extLst>
+      <p:ext uri="{BB962C8B-B14F-4D97-AF65-F5344CB8AC3E}">
+        <p14:creationId xmlns:p14="http://schemas.microsoft.com/office/powerpoint/2010/main" val="2101498062"/>
+      </p:ext>
+    </p:extLst>
+  </p:cSld>
+  <p:clrMapOvr>
+    <a:masterClrMapping/>
+  </p:clrMapOvr>
+</p:sld>
+</file>
+
+<file path=ppt/slides/slide11.xml><?xml version="1.0" encoding="utf-8"?>
+<p:sld xmlns:a="http://schemas.openxmlformats.org/drawingml/2006/main" xmlns:r="http://schemas.openxmlformats.org/officeDocument/2006/relationships" xmlns:p="http://schemas.openxmlformats.org/presentationml/2006/main">
+  <p:cSld>
+    <p:spTree>
+      <p:nvGrpSpPr>
+        <p:cNvPr id="1" name=""/>
+        <p:cNvGrpSpPr/>
+        <p:nvPr/>
+      </p:nvGrpSpPr>
+      <p:grpSpPr>
+        <a:xfrm>
+          <a:off x="0" y="0"/>
+          <a:ext cx="0" cy="0"/>
+          <a:chOff x="0" y="0"/>
+          <a:chExt cx="0" cy="0"/>
+        </a:xfrm>
+      </p:grpSpPr>
+      <p:sp>
+        <p:nvSpPr>
+          <p:cNvPr id="2" name="Title 1">
+            <a:extLst>
+              <a:ext uri="{FF2B5EF4-FFF2-40B4-BE49-F238E27FC236}">
                 <a16:creationId xmlns:a16="http://schemas.microsoft.com/office/drawing/2014/main" id="{F4FFBDD8-8A96-46D6-A6F6-6C1900AB65E8}"/>
               </a:ext>
             </a:extLst>
@@ -3610,115 +3715,6 @@
 </p:sld>
 </file>
 
-<file path=ppt/slides/slide11.xml><?xml version="1.0" encoding="utf-8"?>
-<p:sld xmlns:a="http://schemas.openxmlformats.org/drawingml/2006/main" xmlns:r="http://schemas.openxmlformats.org/officeDocument/2006/relationships" xmlns:p="http://schemas.openxmlformats.org/presentationml/2006/main">
-  <p:cSld>
-    <p:spTree>
-      <p:nvGrpSpPr>
-        <p:cNvPr id="1" name=""/>
-        <p:cNvGrpSpPr/>
-        <p:nvPr/>
-      </p:nvGrpSpPr>
-      <p:grpSpPr>
-        <a:xfrm>
-          <a:off x="0" y="0"/>
-          <a:ext cx="0" cy="0"/>
-          <a:chOff x="0" y="0"/>
-          <a:chExt cx="0" cy="0"/>
-        </a:xfrm>
-      </p:grpSpPr>
-      <p:sp>
-        <p:nvSpPr>
-          <p:cNvPr id="2" name="Title 1">
-            <a:extLst>
-              <a:ext uri="{FF2B5EF4-FFF2-40B4-BE49-F238E27FC236}">
-                <a16:creationId xmlns:a16="http://schemas.microsoft.com/office/drawing/2014/main" id="{AE4036B7-7CB1-4682-A772-1F04CFB1B7EA}"/>
-              </a:ext>
-            </a:extLst>
-          </p:cNvPr>
-          <p:cNvSpPr>
-            <a:spLocks noGrp="1"/>
-          </p:cNvSpPr>
-          <p:nvPr>
-            <p:ph type="title"/>
-          </p:nvPr>
-        </p:nvSpPr>
-        <p:spPr/>
-        <p:txBody>
-          <a:bodyPr/>
-          <a:lstStyle/>
-          <a:p>
-            <a:r>
-              <a:rPr lang="ru-RU" dirty="0">
-                <a:solidFill>
-                  <a:schemeClr val="bg1"/>
-                </a:solidFill>
-              </a:rPr>
-              <a:t>Структура кода:</a:t>
-            </a:r>
-            <a:endParaRPr lang="en-US" dirty="0">
-              <a:solidFill>
-                <a:schemeClr val="bg1"/>
-              </a:solidFill>
-            </a:endParaRPr>
-          </a:p>
-        </p:txBody>
-      </p:sp>
-      <p:sp>
-        <p:nvSpPr>
-          <p:cNvPr id="3" name="Content Placeholder 2">
-            <a:extLst>
-              <a:ext uri="{FF2B5EF4-FFF2-40B4-BE49-F238E27FC236}">
-                <a16:creationId xmlns:a16="http://schemas.microsoft.com/office/drawing/2014/main" id="{C85A34DB-B1D4-4508-BC01-15D9A8B60353}"/>
-              </a:ext>
-            </a:extLst>
-          </p:cNvPr>
-          <p:cNvSpPr>
-            <a:spLocks noGrp="1"/>
-          </p:cNvSpPr>
-          <p:nvPr>
-            <p:ph idx="1"/>
-          </p:nvPr>
-        </p:nvSpPr>
-        <p:spPr/>
-        <p:txBody>
-          <a:bodyPr>
-            <a:normAutofit/>
-          </a:bodyPr>
-          <a:lstStyle/>
-          <a:p>
-            <a:pPr marL="0" indent="0">
-              <a:buNone/>
-            </a:pPr>
-            <a:r>
-              <a:rPr lang="ru-RU" sz="6600" dirty="0">
-                <a:solidFill>
-                  <a:schemeClr val="bg1"/>
-                </a:solidFill>
-              </a:rPr>
-              <a:t>Лучше не надо</a:t>
-            </a:r>
-            <a:endParaRPr lang="en-US" sz="6600" dirty="0">
-              <a:solidFill>
-                <a:schemeClr val="bg1"/>
-              </a:solidFill>
-            </a:endParaRPr>
-          </a:p>
-        </p:txBody>
-      </p:sp>
-    </p:spTree>
-    <p:extLst>
-      <p:ext uri="{BB962C8B-B14F-4D97-AF65-F5344CB8AC3E}">
-        <p14:creationId xmlns:p14="http://schemas.microsoft.com/office/powerpoint/2010/main" val="2586611565"/>
-      </p:ext>
-    </p:extLst>
-  </p:cSld>
-  <p:clrMapOvr>
-    <a:masterClrMapping/>
-  </p:clrMapOvr>
-</p:sld>
-</file>
-
 <file path=ppt/slides/slide12.xml><?xml version="1.0" encoding="utf-8"?>
 <p:sld xmlns:a="http://schemas.openxmlformats.org/drawingml/2006/main" xmlns:r="http://schemas.openxmlformats.org/officeDocument/2006/relationships" xmlns:p="http://schemas.openxmlformats.org/presentationml/2006/main">
   <p:cSld>
@@ -3741,6 +3737,115 @@
           <p:cNvPr id="2" name="Title 1">
             <a:extLst>
               <a:ext uri="{FF2B5EF4-FFF2-40B4-BE49-F238E27FC236}">
+                <a16:creationId xmlns:a16="http://schemas.microsoft.com/office/drawing/2014/main" id="{AE4036B7-7CB1-4682-A772-1F04CFB1B7EA}"/>
+              </a:ext>
+            </a:extLst>
+          </p:cNvPr>
+          <p:cNvSpPr>
+            <a:spLocks noGrp="1"/>
+          </p:cNvSpPr>
+          <p:nvPr>
+            <p:ph type="title"/>
+          </p:nvPr>
+        </p:nvSpPr>
+        <p:spPr/>
+        <p:txBody>
+          <a:bodyPr/>
+          <a:lstStyle/>
+          <a:p>
+            <a:r>
+              <a:rPr lang="ru-RU" dirty="0">
+                <a:solidFill>
+                  <a:schemeClr val="bg1"/>
+                </a:solidFill>
+              </a:rPr>
+              <a:t>Структура кода:</a:t>
+            </a:r>
+            <a:endParaRPr lang="en-US" dirty="0">
+              <a:solidFill>
+                <a:schemeClr val="bg1"/>
+              </a:solidFill>
+            </a:endParaRPr>
+          </a:p>
+        </p:txBody>
+      </p:sp>
+      <p:sp>
+        <p:nvSpPr>
+          <p:cNvPr id="3" name="Content Placeholder 2">
+            <a:extLst>
+              <a:ext uri="{FF2B5EF4-FFF2-40B4-BE49-F238E27FC236}">
+                <a16:creationId xmlns:a16="http://schemas.microsoft.com/office/drawing/2014/main" id="{C85A34DB-B1D4-4508-BC01-15D9A8B60353}"/>
+              </a:ext>
+            </a:extLst>
+          </p:cNvPr>
+          <p:cNvSpPr>
+            <a:spLocks noGrp="1"/>
+          </p:cNvSpPr>
+          <p:nvPr>
+            <p:ph idx="1"/>
+          </p:nvPr>
+        </p:nvSpPr>
+        <p:spPr/>
+        <p:txBody>
+          <a:bodyPr>
+            <a:normAutofit/>
+          </a:bodyPr>
+          <a:lstStyle/>
+          <a:p>
+            <a:pPr marL="0" indent="0">
+              <a:buNone/>
+            </a:pPr>
+            <a:r>
+              <a:rPr lang="ru-RU" sz="6600" dirty="0">
+                <a:solidFill>
+                  <a:schemeClr val="bg1"/>
+                </a:solidFill>
+              </a:rPr>
+              <a:t>Лучше не надо</a:t>
+            </a:r>
+            <a:endParaRPr lang="en-US" sz="6600" dirty="0">
+              <a:solidFill>
+                <a:schemeClr val="bg1"/>
+              </a:solidFill>
+            </a:endParaRPr>
+          </a:p>
+        </p:txBody>
+      </p:sp>
+    </p:spTree>
+    <p:extLst>
+      <p:ext uri="{BB962C8B-B14F-4D97-AF65-F5344CB8AC3E}">
+        <p14:creationId xmlns:p14="http://schemas.microsoft.com/office/powerpoint/2010/main" val="2586611565"/>
+      </p:ext>
+    </p:extLst>
+  </p:cSld>
+  <p:clrMapOvr>
+    <a:masterClrMapping/>
+  </p:clrMapOvr>
+</p:sld>
+</file>
+
+<file path=ppt/slides/slide13.xml><?xml version="1.0" encoding="utf-8"?>
+<p:sld xmlns:a="http://schemas.openxmlformats.org/drawingml/2006/main" xmlns:r="http://schemas.openxmlformats.org/officeDocument/2006/relationships" xmlns:p="http://schemas.openxmlformats.org/presentationml/2006/main">
+  <p:cSld>
+    <p:spTree>
+      <p:nvGrpSpPr>
+        <p:cNvPr id="1" name=""/>
+        <p:cNvGrpSpPr/>
+        <p:nvPr/>
+      </p:nvGrpSpPr>
+      <p:grpSpPr>
+        <a:xfrm>
+          <a:off x="0" y="0"/>
+          <a:ext cx="0" cy="0"/>
+          <a:chOff x="0" y="0"/>
+          <a:chExt cx="0" cy="0"/>
+        </a:xfrm>
+      </p:grpSpPr>
+      <p:sp>
+        <p:nvSpPr>
+          <p:cNvPr id="2" name="Title 1">
+            <a:extLst>
+              <a:ext uri="{FF2B5EF4-FFF2-40B4-BE49-F238E27FC236}">
                 <a16:creationId xmlns:a16="http://schemas.microsoft.com/office/drawing/2014/main" id="{8252AA07-E9C0-4219-BDE4-D85BB1D73B62}"/>
               </a:ext>
             </a:extLst>
@@ -3921,7 +4026,7 @@
 </p:sld>
 </file>
 
-<file path=ppt/slides/slide13.xml><?xml version="1.0" encoding="utf-8"?>
+<file path=ppt/slides/slide14.xml><?xml version="1.0" encoding="utf-8"?>
 <p:sld xmlns:a="http://schemas.openxmlformats.org/drawingml/2006/main" xmlns:r="http://schemas.openxmlformats.org/officeDocument/2006/relationships" xmlns:p="http://schemas.openxmlformats.org/presentationml/2006/main">
   <p:cSld>
     <p:spTree>
@@ -5027,6 +5132,135 @@
           <p:cNvPr id="2" name="Title 1">
             <a:extLst>
               <a:ext uri="{FF2B5EF4-FFF2-40B4-BE49-F238E27FC236}">
+                <a16:creationId xmlns:a16="http://schemas.microsoft.com/office/drawing/2014/main" id="{09E27A56-04BA-475A-ABAB-A86C330BE824}"/>
+              </a:ext>
+            </a:extLst>
+          </p:cNvPr>
+          <p:cNvSpPr>
+            <a:spLocks noGrp="1"/>
+          </p:cNvSpPr>
+          <p:nvPr>
+            <p:ph type="title"/>
+          </p:nvPr>
+        </p:nvSpPr>
+        <p:spPr/>
+        <p:txBody>
+          <a:bodyPr/>
+          <a:lstStyle/>
+          <a:p>
+            <a:r>
+              <a:rPr lang="ru-RU" dirty="0">
+                <a:solidFill>
+                  <a:schemeClr val="bg1"/>
+                </a:solidFill>
+              </a:rPr>
+              <a:t>Средства разработки</a:t>
+            </a:r>
+            <a:endParaRPr lang="en-US" dirty="0">
+              <a:solidFill>
+                <a:schemeClr val="bg1"/>
+              </a:solidFill>
+            </a:endParaRPr>
+          </a:p>
+        </p:txBody>
+      </p:sp>
+      <p:sp>
+        <p:nvSpPr>
+          <p:cNvPr id="3" name="Content Placeholder 2">
+            <a:extLst>
+              <a:ext uri="{FF2B5EF4-FFF2-40B4-BE49-F238E27FC236}">
+                <a16:creationId xmlns:a16="http://schemas.microsoft.com/office/drawing/2014/main" id="{6754561E-FBCB-48EA-9BDC-2B0FB1CBDFE7}"/>
+              </a:ext>
+            </a:extLst>
+          </p:cNvPr>
+          <p:cNvSpPr>
+            <a:spLocks noGrp="1"/>
+          </p:cNvSpPr>
+          <p:nvPr>
+            <p:ph idx="1"/>
+          </p:nvPr>
+        </p:nvSpPr>
+        <p:spPr/>
+        <p:txBody>
+          <a:bodyPr/>
+          <a:lstStyle/>
+          <a:p>
+            <a:r>
+              <a:rPr lang="en-US" dirty="0">
+                <a:solidFill>
+                  <a:schemeClr val="bg1"/>
+                </a:solidFill>
+              </a:rPr>
+              <a:t>Asp net Core 2.2</a:t>
+            </a:r>
+          </a:p>
+          <a:p>
+            <a:r>
+              <a:rPr lang="en-US" dirty="0">
+                <a:solidFill>
+                  <a:schemeClr val="bg1"/>
+                </a:solidFill>
+              </a:rPr>
+              <a:t>Mongo DB</a:t>
+            </a:r>
+          </a:p>
+          <a:p>
+            <a:r>
+              <a:rPr lang="en-US" dirty="0">
+                <a:solidFill>
+                  <a:schemeClr val="bg1"/>
+                </a:solidFill>
+              </a:rPr>
+              <a:t>Visual studio 2017</a:t>
+            </a:r>
+          </a:p>
+          <a:p>
+            <a:r>
+              <a:rPr lang="en-US">
+                <a:solidFill>
+                  <a:schemeClr val="bg1"/>
+                </a:solidFill>
+              </a:rPr>
+              <a:t>JetBrains Rider</a:t>
+            </a:r>
+          </a:p>
+        </p:txBody>
+      </p:sp>
+    </p:spTree>
+    <p:extLst>
+      <p:ext uri="{BB962C8B-B14F-4D97-AF65-F5344CB8AC3E}">
+        <p14:creationId xmlns:p14="http://schemas.microsoft.com/office/powerpoint/2010/main" val="326911070"/>
+      </p:ext>
+    </p:extLst>
+  </p:cSld>
+  <p:clrMapOvr>
+    <a:masterClrMapping/>
+  </p:clrMapOvr>
+</p:sld>
+</file>
+
+<file path=ppt/slides/slide8.xml><?xml version="1.0" encoding="utf-8"?>
+<p:sld xmlns:a="http://schemas.openxmlformats.org/drawingml/2006/main" xmlns:r="http://schemas.openxmlformats.org/officeDocument/2006/relationships" xmlns:p="http://schemas.openxmlformats.org/presentationml/2006/main">
+  <p:cSld>
+    <p:spTree>
+      <p:nvGrpSpPr>
+        <p:cNvPr id="1" name=""/>
+        <p:cNvGrpSpPr/>
+        <p:nvPr/>
+      </p:nvGrpSpPr>
+      <p:grpSpPr>
+        <a:xfrm>
+          <a:off x="0" y="0"/>
+          <a:ext cx="0" cy="0"/>
+          <a:chOff x="0" y="0"/>
+          <a:chExt cx="0" cy="0"/>
+        </a:xfrm>
+      </p:grpSpPr>
+      <p:sp>
+        <p:nvSpPr>
+          <p:cNvPr id="2" name="Title 1">
+            <a:extLst>
+              <a:ext uri="{FF2B5EF4-FFF2-40B4-BE49-F238E27FC236}">
                 <a16:creationId xmlns:a16="http://schemas.microsoft.com/office/drawing/2014/main" id="{2377BF00-79EB-4F97-9F00-D337D36AF0BC}"/>
               </a:ext>
             </a:extLst>
@@ -5104,7 +5338,7 @@
 </p:sld>
 </file>
 
-<file path=ppt/slides/slide8.xml><?xml version="1.0" encoding="utf-8"?>
+<file path=ppt/slides/slide9.xml><?xml version="1.0" encoding="utf-8"?>
 <p:sld xmlns:a="http://schemas.openxmlformats.org/drawingml/2006/main" xmlns:r="http://schemas.openxmlformats.org/officeDocument/2006/relationships" xmlns:p="http://schemas.openxmlformats.org/presentationml/2006/main">
   <p:cSld>
     <p:spTree>
@@ -5199,105 +5433,6 @@
     <p:extLst>
       <p:ext uri="{BB962C8B-B14F-4D97-AF65-F5344CB8AC3E}">
         <p14:creationId xmlns:p14="http://schemas.microsoft.com/office/powerpoint/2010/main" val="447430459"/>
-      </p:ext>
-    </p:extLst>
-  </p:cSld>
-  <p:clrMapOvr>
-    <a:masterClrMapping/>
-  </p:clrMapOvr>
-</p:sld>
-</file>
-
-<file path=ppt/slides/slide9.xml><?xml version="1.0" encoding="utf-8"?>
-<p:sld xmlns:a="http://schemas.openxmlformats.org/drawingml/2006/main" xmlns:r="http://schemas.openxmlformats.org/officeDocument/2006/relationships" xmlns:p="http://schemas.openxmlformats.org/presentationml/2006/main">
-  <p:cSld>
-    <p:spTree>
-      <p:nvGrpSpPr>
-        <p:cNvPr id="1" name=""/>
-        <p:cNvGrpSpPr/>
-        <p:nvPr/>
-      </p:nvGrpSpPr>
-      <p:grpSpPr>
-        <a:xfrm>
-          <a:off x="0" y="0"/>
-          <a:ext cx="0" cy="0"/>
-          <a:chOff x="0" y="0"/>
-          <a:chExt cx="0" cy="0"/>
-        </a:xfrm>
-      </p:grpSpPr>
-      <p:sp>
-        <p:nvSpPr>
-          <p:cNvPr id="2" name="Title 1">
-            <a:extLst>
-              <a:ext uri="{FF2B5EF4-FFF2-40B4-BE49-F238E27FC236}">
-                <a16:creationId xmlns:a16="http://schemas.microsoft.com/office/drawing/2014/main" id="{C3E15874-AE93-4FD0-84A8-A409885B3D9D}"/>
-              </a:ext>
-            </a:extLst>
-          </p:cNvPr>
-          <p:cNvSpPr>
-            <a:spLocks noGrp="1"/>
-          </p:cNvSpPr>
-          <p:nvPr>
-            <p:ph type="title"/>
-          </p:nvPr>
-        </p:nvSpPr>
-        <p:spPr/>
-        <p:txBody>
-          <a:bodyPr/>
-          <a:lstStyle/>
-          <a:p>
-            <a:r>
-              <a:rPr lang="ru-RU" dirty="0">
-                <a:solidFill>
-                  <a:schemeClr val="bg1"/>
-                </a:solidFill>
-              </a:rPr>
-              <a:t>Отчет после боя</a:t>
-            </a:r>
-            <a:endParaRPr lang="en-US" dirty="0">
-              <a:solidFill>
-                <a:schemeClr val="bg1"/>
-              </a:solidFill>
-            </a:endParaRPr>
-          </a:p>
-        </p:txBody>
-      </p:sp>
-      <p:pic>
-        <p:nvPicPr>
-          <p:cNvPr id="4" name="Content Placeholder 3">
-            <a:extLst>
-              <a:ext uri="{FF2B5EF4-FFF2-40B4-BE49-F238E27FC236}">
-                <a16:creationId xmlns:a16="http://schemas.microsoft.com/office/drawing/2014/main" id="{0193E776-2E0C-4FC7-AE0F-AF6C4A760EAB}"/>
-              </a:ext>
-            </a:extLst>
-          </p:cNvPr>
-          <p:cNvPicPr>
-            <a:picLocks noGrp="1" noChangeAspect="1"/>
-          </p:cNvPicPr>
-          <p:nvPr>
-            <p:ph idx="1"/>
-          </p:nvPr>
-        </p:nvPicPr>
-        <p:blipFill>
-          <a:blip r:embed="rId2"/>
-          <a:stretch>
-            <a:fillRect/>
-          </a:stretch>
-        </p:blipFill>
-        <p:spPr>
-          <a:xfrm>
-            <a:off x="2932546" y="1825625"/>
-            <a:ext cx="6326908" cy="4351338"/>
-          </a:xfrm>
-          <a:prstGeom prst="rect">
-            <a:avLst/>
-          </a:prstGeom>
-        </p:spPr>
-      </p:pic>
-    </p:spTree>
-    <p:extLst>
-      <p:ext uri="{BB962C8B-B14F-4D97-AF65-F5344CB8AC3E}">
-        <p14:creationId xmlns:p14="http://schemas.microsoft.com/office/powerpoint/2010/main" val="2101498062"/>
       </p:ext>
     </p:extLst>
   </p:cSld>

</xml_diff>